<commit_message>
feat: Adicionado slide com Evidência de Execução no Github Actions
</commit_message>
<xml_diff>
--- a/Documentacao_Testes.pptx
+++ b/Documentacao_Testes.pptx
@@ -22,6 +22,7 @@
     <p:sldId id="260" r:id="rId17"/>
     <p:sldId id="261" r:id="rId18"/>
     <p:sldId id="262" r:id="rId19"/>
+    <p:sldId id="263" r:id="rId20"/>
   </p:sldIdLst>
   <p:sldSz cx="9144000" cy="6858000"/>
   <p:notesSz cx="7559675" cy="10691813"/>
@@ -58,7 +59,7 @@
         <p:spPr>
           <a:xfrm>
             <a:off x="457200" y="274680"/>
-            <a:ext cx="8228880" cy="1142280"/>
+            <a:ext cx="8228520" cy="1141920"/>
           </a:xfrm>
           <a:prstGeom prst="rect">
             <a:avLst/>
@@ -98,7 +99,7 @@
         <p:spPr>
           <a:xfrm>
             <a:off x="457200" y="1600200"/>
-            <a:ext cx="8228880" cy="4525200"/>
+            <a:ext cx="8228520" cy="4524840"/>
           </a:xfrm>
           <a:prstGeom prst="rect">
             <a:avLst/>
@@ -159,7 +160,7 @@
         <p:txBody>
           <a:bodyPr/>
           <a:p>
-            <a:fld id="{6D0DED35-DE14-433E-917B-709A2904802E}" type="slidenum">
+            <a:fld id="{C15AED0E-0EBF-4E4C-8A1F-2621B75AD107}" type="slidenum">
               <a:t>&lt;#&gt;</a:t>
             </a:fld>
           </a:p>
@@ -242,7 +243,7 @@
         <p:txBody>
           <a:bodyPr/>
           <a:p>
-            <a:fld id="{03E2A2C0-EA44-4D0D-892E-E6C0BBB9332C}" type="slidenum">
+            <a:fld id="{97EFAFFB-B5DC-45AA-ABEF-CB9B2C1D7041}" type="slidenum">
               <a:t>&lt;#&gt;</a:t>
             </a:fld>
           </a:p>
@@ -325,7 +326,7 @@
         <p:txBody>
           <a:bodyPr/>
           <a:p>
-            <a:fld id="{4E87869D-D0DE-40B2-91C8-1075F76EB6E1}" type="slidenum">
+            <a:fld id="{8D041D09-46BC-4EE4-94A8-446E66F21529}" type="slidenum">
               <a:t>&lt;#&gt;</a:t>
             </a:fld>
           </a:p>
@@ -408,7 +409,7 @@
         <p:txBody>
           <a:bodyPr/>
           <a:p>
-            <a:fld id="{D58B6A7D-BD60-4B78-93FD-43B513DEA24C}" type="slidenum">
+            <a:fld id="{D6374F6E-1A33-40B5-810E-B13C2AF1EEE9}" type="slidenum">
               <a:t>&lt;#&gt;</a:t>
             </a:fld>
           </a:p>
@@ -491,7 +492,7 @@
         <p:txBody>
           <a:bodyPr/>
           <a:p>
-            <a:fld id="{27BB3999-0EFC-4DF3-A3DC-2CCA2657D0FA}" type="slidenum">
+            <a:fld id="{464D7247-A3ED-426B-8C88-7184719E5773}" type="slidenum">
               <a:t>&lt;#&gt;</a:t>
             </a:fld>
           </a:p>
@@ -553,7 +554,7 @@
         <p:spPr>
           <a:xfrm>
             <a:off x="457200" y="274680"/>
-            <a:ext cx="8228880" cy="1142280"/>
+            <a:ext cx="8228520" cy="1141920"/>
           </a:xfrm>
           <a:prstGeom prst="rect">
             <a:avLst/>
@@ -593,7 +594,7 @@
         <p:spPr>
           <a:xfrm>
             <a:off x="457200" y="1600200"/>
-            <a:ext cx="8228880" cy="4525200"/>
+            <a:ext cx="8228520" cy="4524840"/>
           </a:xfrm>
           <a:prstGeom prst="rect">
             <a:avLst/>
@@ -657,7 +658,7 @@
         <p:txBody>
           <a:bodyPr/>
           <a:p>
-            <a:fld id="{7506DD82-FC2F-4014-863C-893679DDC656}" type="slidenum">
+            <a:fld id="{3EE102DE-0660-415A-AB13-0880D996001C}" type="slidenum">
               <a:t>&lt;#&gt;</a:t>
             </a:fld>
           </a:p>
@@ -740,7 +741,7 @@
         <p:txBody>
           <a:bodyPr/>
           <a:p>
-            <a:fld id="{ED89D0BF-3698-40CE-BFE5-7F96B0329904}" type="slidenum">
+            <a:fld id="{E7F456A7-CACC-4DD2-AE67-D179BED08112}" type="slidenum">
               <a:t>&lt;#&gt;</a:t>
             </a:fld>
           </a:p>
@@ -802,7 +803,7 @@
         <p:spPr>
           <a:xfrm>
             <a:off x="457200" y="274680"/>
-            <a:ext cx="8228880" cy="1142280"/>
+            <a:ext cx="8228520" cy="1141920"/>
           </a:xfrm>
           <a:prstGeom prst="rect">
             <a:avLst/>
@@ -842,7 +843,7 @@
         <p:spPr>
           <a:xfrm>
             <a:off x="457200" y="1600200"/>
-            <a:ext cx="4015440" cy="4525200"/>
+            <a:ext cx="4015440" cy="4524840"/>
           </a:xfrm>
           <a:prstGeom prst="rect">
             <a:avLst/>
@@ -885,7 +886,7 @@
         <p:spPr>
           <a:xfrm>
             <a:off x="4673880" y="1600200"/>
-            <a:ext cx="4015440" cy="4525200"/>
+            <a:ext cx="4015440" cy="4524840"/>
           </a:xfrm>
           <a:prstGeom prst="rect">
             <a:avLst/>
@@ -949,7 +950,7 @@
         <p:txBody>
           <a:bodyPr/>
           <a:p>
-            <a:fld id="{79D97DD0-5D20-4053-A22B-2D728C93E6BA}" type="slidenum">
+            <a:fld id="{78528BB0-F3A9-4175-AC78-26EDEE78741F}" type="slidenum">
               <a:t>&lt;#&gt;</a:t>
             </a:fld>
           </a:p>
@@ -1032,7 +1033,7 @@
         <p:txBody>
           <a:bodyPr/>
           <a:p>
-            <a:fld id="{C8F5417E-42EC-4C3A-84F6-F67C2FD0B420}" type="slidenum">
+            <a:fld id="{13455B05-E579-408C-AEA4-665548778EC6}" type="slidenum">
               <a:t>&lt;#&gt;</a:t>
             </a:fld>
           </a:p>
@@ -1094,7 +1095,7 @@
         <p:spPr>
           <a:xfrm>
             <a:off x="457200" y="274680"/>
-            <a:ext cx="8228880" cy="1142280"/>
+            <a:ext cx="8228520" cy="1141920"/>
           </a:xfrm>
           <a:prstGeom prst="rect">
             <a:avLst/>
@@ -1155,7 +1156,7 @@
         <p:txBody>
           <a:bodyPr/>
           <a:p>
-            <a:fld id="{15D5CA4A-4FB0-4E87-947F-897A5B6D4136}" type="slidenum">
+            <a:fld id="{7FB2CBDC-AF33-4169-95C7-E465DB7B9523}" type="slidenum">
               <a:t>&lt;#&gt;</a:t>
             </a:fld>
           </a:p>
@@ -1238,7 +1239,7 @@
         <p:txBody>
           <a:bodyPr/>
           <a:p>
-            <a:fld id="{7D17E13C-ACE5-4888-971C-ACA948E82743}" type="slidenum">
+            <a:fld id="{CBDB2EE0-3046-4280-9549-892B6529B444}" type="slidenum">
               <a:t>&lt;#&gt;</a:t>
             </a:fld>
           </a:p>
@@ -1307,7 +1308,7 @@
         <p:spPr>
           <a:xfrm>
             <a:off x="457200" y="274680"/>
-            <a:ext cx="8228880" cy="1142280"/>
+            <a:ext cx="8228520" cy="1141920"/>
           </a:xfrm>
           <a:prstGeom prst="rect">
             <a:avLst/>
@@ -1356,7 +1357,7 @@
         <p:spPr>
           <a:xfrm>
             <a:off x="3124080" y="6356520"/>
-            <a:ext cx="2894760" cy="364320"/>
+            <a:ext cx="2894400" cy="363960"/>
           </a:xfrm>
           <a:prstGeom prst="rect">
             <a:avLst/>
@@ -1404,7 +1405,7 @@
                 </a:solidFill>
                 <a:latin typeface="Times New Roman"/>
               </a:rPr>
-              <a:t> </a:t>
+              <a:t>&lt;rodapé&gt;</a:t>
             </a:r>
             <a:endParaRPr b="0" lang="pt-BR" sz="1400" spc="-1" strike="noStrike">
               <a:solidFill>
@@ -1428,7 +1429,7 @@
         <p:spPr>
           <a:xfrm>
             <a:off x="6553080" y="6356520"/>
-            <a:ext cx="2133000" cy="364320"/>
+            <a:ext cx="2132640" cy="363960"/>
           </a:xfrm>
           <a:prstGeom prst="rect">
             <a:avLst/>
@@ -1471,7 +1472,7 @@
                 <a:tab algn="l" pos="0"/>
               </a:tabLst>
             </a:pPr>
-            <a:fld id="{E68D61B9-E7E6-434B-A4B7-C0E60FE940B2}" type="slidenum">
+            <a:fld id="{85AC1EF3-4678-4AEB-B7D6-DAE10C3457FC}" type="slidenum">
               <a:rPr b="0" lang="en-US" sz="1200" spc="-1" strike="noStrike">
                 <a:solidFill>
                   <a:schemeClr val="dk1">
@@ -1480,7 +1481,7 @@
                 </a:solidFill>
                 <a:latin typeface="Calibri"/>
               </a:rPr>
-              <a:t>7</a:t>
+              <a:t>&lt;número&gt;</a:t>
             </a:fld>
             <a:endParaRPr b="0" lang="pt-BR" sz="1200" spc="-1" strike="noStrike">
               <a:solidFill>
@@ -1504,7 +1505,7 @@
         <p:spPr>
           <a:xfrm>
             <a:off x="457200" y="6356520"/>
-            <a:ext cx="2133000" cy="364320"/>
+            <a:ext cx="2132640" cy="363960"/>
           </a:xfrm>
           <a:prstGeom prst="rect">
             <a:avLst/>
@@ -1540,7 +1541,7 @@
                 </a:solidFill>
                 <a:latin typeface="Times New Roman"/>
               </a:rPr>
-              <a:t> </a:t>
+              <a:t>&lt;data/hora&gt;</a:t>
             </a:r>
             <a:endParaRPr b="0" lang="pt-BR" sz="1400" spc="-1" strike="noStrike">
               <a:solidFill>
@@ -1822,7 +1823,7 @@
         <p:spPr>
           <a:xfrm>
             <a:off x="3124080" y="6356520"/>
-            <a:ext cx="2894760" cy="364320"/>
+            <a:ext cx="2894400" cy="363960"/>
           </a:xfrm>
           <a:prstGeom prst="rect">
             <a:avLst/>
@@ -1894,7 +1895,7 @@
         <p:spPr>
           <a:xfrm>
             <a:off x="6553080" y="6356520"/>
-            <a:ext cx="2133000" cy="364320"/>
+            <a:ext cx="2132640" cy="363960"/>
           </a:xfrm>
           <a:prstGeom prst="rect">
             <a:avLst/>
@@ -1937,7 +1938,7 @@
                 <a:tab algn="l" pos="0"/>
               </a:tabLst>
             </a:pPr>
-            <a:fld id="{070DCCB5-6409-43C5-8DFC-9228CF1B30B5}" type="slidenum">
+            <a:fld id="{393E4917-A43B-4E89-BDD7-3BDD2048BFCD}" type="slidenum">
               <a:rPr b="0" lang="en-US" sz="1200" spc="-1" strike="noStrike">
                 <a:solidFill>
                   <a:schemeClr val="dk1">
@@ -1970,7 +1971,7 @@
         <p:spPr>
           <a:xfrm>
             <a:off x="457200" y="6356520"/>
-            <a:ext cx="2133000" cy="364320"/>
+            <a:ext cx="2132640" cy="363960"/>
           </a:xfrm>
           <a:prstGeom prst="rect">
             <a:avLst/>
@@ -2063,7 +2064,7 @@
         <p:spPr>
           <a:xfrm>
             <a:off x="3124080" y="6356520"/>
-            <a:ext cx="2894760" cy="364320"/>
+            <a:ext cx="2894400" cy="363960"/>
           </a:xfrm>
           <a:prstGeom prst="rect">
             <a:avLst/>
@@ -2135,7 +2136,7 @@
         <p:spPr>
           <a:xfrm>
             <a:off x="6553080" y="6356520"/>
-            <a:ext cx="2133000" cy="364320"/>
+            <a:ext cx="2132640" cy="363960"/>
           </a:xfrm>
           <a:prstGeom prst="rect">
             <a:avLst/>
@@ -2178,7 +2179,7 @@
                 <a:tab algn="l" pos="0"/>
               </a:tabLst>
             </a:pPr>
-            <a:fld id="{45D3D0EC-9340-4298-946D-0CF11B6B9DE6}" type="slidenum">
+            <a:fld id="{E42D2E80-3DB4-4479-B18A-0F8E0DC28AE0}" type="slidenum">
               <a:rPr b="0" lang="en-US" sz="1200" spc="-1" strike="noStrike">
                 <a:solidFill>
                   <a:schemeClr val="dk1">
@@ -2211,7 +2212,7 @@
         <p:spPr>
           <a:xfrm>
             <a:off x="457200" y="6356520"/>
-            <a:ext cx="2133000" cy="364320"/>
+            <a:ext cx="2132640" cy="363960"/>
           </a:xfrm>
           <a:prstGeom prst="rect">
             <a:avLst/>
@@ -2304,7 +2305,7 @@
         <p:spPr>
           <a:xfrm>
             <a:off x="3124080" y="6356520"/>
-            <a:ext cx="2894760" cy="364320"/>
+            <a:ext cx="2894400" cy="363960"/>
           </a:xfrm>
           <a:prstGeom prst="rect">
             <a:avLst/>
@@ -2376,7 +2377,7 @@
         <p:spPr>
           <a:xfrm>
             <a:off x="6553080" y="6356520"/>
-            <a:ext cx="2133000" cy="364320"/>
+            <a:ext cx="2132640" cy="363960"/>
           </a:xfrm>
           <a:prstGeom prst="rect">
             <a:avLst/>
@@ -2419,7 +2420,7 @@
                 <a:tab algn="l" pos="0"/>
               </a:tabLst>
             </a:pPr>
-            <a:fld id="{899D236B-CF84-4376-B80D-95CE2524E833}" type="slidenum">
+            <a:fld id="{70AC6F16-E445-49D9-A6F1-CC9EDCD04F10}" type="slidenum">
               <a:rPr b="0" lang="en-US" sz="1200" spc="-1" strike="noStrike">
                 <a:solidFill>
                   <a:schemeClr val="dk1">
@@ -2452,7 +2453,7 @@
         <p:spPr>
           <a:xfrm>
             <a:off x="457200" y="6356520"/>
-            <a:ext cx="2133000" cy="364320"/>
+            <a:ext cx="2132640" cy="363960"/>
           </a:xfrm>
           <a:prstGeom prst="rect">
             <a:avLst/>
@@ -2545,7 +2546,7 @@
         <p:spPr>
           <a:xfrm>
             <a:off x="3124080" y="6356520"/>
-            <a:ext cx="2894760" cy="364320"/>
+            <a:ext cx="2894400" cy="363960"/>
           </a:xfrm>
           <a:prstGeom prst="rect">
             <a:avLst/>
@@ -2617,7 +2618,7 @@
         <p:spPr>
           <a:xfrm>
             <a:off x="6553080" y="6356520"/>
-            <a:ext cx="2133000" cy="364320"/>
+            <a:ext cx="2132640" cy="363960"/>
           </a:xfrm>
           <a:prstGeom prst="rect">
             <a:avLst/>
@@ -2660,7 +2661,7 @@
                 <a:tab algn="l" pos="0"/>
               </a:tabLst>
             </a:pPr>
-            <a:fld id="{DFBF240D-083C-425A-845C-40AF2E4AE165}" type="slidenum">
+            <a:fld id="{4ADCE783-A40B-4738-9F7C-22E27BEA5D96}" type="slidenum">
               <a:rPr b="0" lang="en-US" sz="1200" spc="-1" strike="noStrike">
                 <a:solidFill>
                   <a:schemeClr val="dk1">
@@ -2693,7 +2694,7 @@
         <p:spPr>
           <a:xfrm>
             <a:off x="457200" y="6356520"/>
-            <a:ext cx="2133000" cy="364320"/>
+            <a:ext cx="2132640" cy="363960"/>
           </a:xfrm>
           <a:prstGeom prst="rect">
             <a:avLst/>
@@ -2786,7 +2787,7 @@
         <p:spPr>
           <a:xfrm>
             <a:off x="457200" y="274680"/>
-            <a:ext cx="8228880" cy="1142280"/>
+            <a:ext cx="8228520" cy="1141920"/>
           </a:xfrm>
           <a:prstGeom prst="rect">
             <a:avLst/>
@@ -2835,7 +2836,7 @@
         <p:spPr>
           <a:xfrm>
             <a:off x="457200" y="1600200"/>
-            <a:ext cx="8228880" cy="4525200"/>
+            <a:ext cx="8228520" cy="4524840"/>
           </a:xfrm>
           <a:prstGeom prst="rect">
             <a:avLst/>
@@ -3060,7 +3061,7 @@
         <p:spPr>
           <a:xfrm>
             <a:off x="3124080" y="6356520"/>
-            <a:ext cx="2894760" cy="364320"/>
+            <a:ext cx="2894400" cy="363960"/>
           </a:xfrm>
           <a:prstGeom prst="rect">
             <a:avLst/>
@@ -3132,7 +3133,7 @@
         <p:spPr>
           <a:xfrm>
             <a:off x="6553080" y="6356520"/>
-            <a:ext cx="2133000" cy="364320"/>
+            <a:ext cx="2132640" cy="363960"/>
           </a:xfrm>
           <a:prstGeom prst="rect">
             <a:avLst/>
@@ -3175,7 +3176,7 @@
                 <a:tab algn="l" pos="0"/>
               </a:tabLst>
             </a:pPr>
-            <a:fld id="{93698971-C553-456E-8B8F-DAAA137267FB}" type="slidenum">
+            <a:fld id="{CF136039-2CAC-4155-90D9-A5524AAE8974}" type="slidenum">
               <a:rPr b="0" lang="en-US" sz="1200" spc="-1" strike="noStrike">
                 <a:solidFill>
                   <a:schemeClr val="dk1">
@@ -3208,7 +3209,7 @@
         <p:spPr>
           <a:xfrm>
             <a:off x="457200" y="6356520"/>
-            <a:ext cx="2133000" cy="364320"/>
+            <a:ext cx="2132640" cy="363960"/>
           </a:xfrm>
           <a:prstGeom prst="rect">
             <a:avLst/>
@@ -3301,7 +3302,7 @@
         <p:spPr>
           <a:xfrm>
             <a:off x="3124080" y="6356520"/>
-            <a:ext cx="2894760" cy="364320"/>
+            <a:ext cx="2894400" cy="363960"/>
           </a:xfrm>
           <a:prstGeom prst="rect">
             <a:avLst/>
@@ -3373,7 +3374,7 @@
         <p:spPr>
           <a:xfrm>
             <a:off x="6553080" y="6356520"/>
-            <a:ext cx="2133000" cy="364320"/>
+            <a:ext cx="2132640" cy="363960"/>
           </a:xfrm>
           <a:prstGeom prst="rect">
             <a:avLst/>
@@ -3416,7 +3417,7 @@
                 <a:tab algn="l" pos="0"/>
               </a:tabLst>
             </a:pPr>
-            <a:fld id="{60362E0F-F978-4EA5-A2A9-55E52BFCF880}" type="slidenum">
+            <a:fld id="{B50EFA96-26CB-4052-B3E9-11A91026A7AE}" type="slidenum">
               <a:rPr b="0" lang="en-US" sz="1200" spc="-1" strike="noStrike">
                 <a:solidFill>
                   <a:schemeClr val="dk1">
@@ -3449,7 +3450,7 @@
         <p:spPr>
           <a:xfrm>
             <a:off x="457200" y="6356520"/>
-            <a:ext cx="2133000" cy="364320"/>
+            <a:ext cx="2132640" cy="363960"/>
           </a:xfrm>
           <a:prstGeom prst="rect">
             <a:avLst/>
@@ -3542,7 +3543,7 @@
         <p:spPr>
           <a:xfrm>
             <a:off x="457200" y="274680"/>
-            <a:ext cx="8228880" cy="1142280"/>
+            <a:ext cx="8228520" cy="1141920"/>
           </a:xfrm>
           <a:prstGeom prst="rect">
             <a:avLst/>
@@ -3591,7 +3592,7 @@
         <p:spPr>
           <a:xfrm>
             <a:off x="457200" y="1600200"/>
-            <a:ext cx="4015440" cy="4525200"/>
+            <a:ext cx="4015080" cy="4524840"/>
           </a:xfrm>
           <a:prstGeom prst="rect">
             <a:avLst/>
@@ -3815,8 +3816,8 @@
         </p:nvSpPr>
         <p:spPr>
           <a:xfrm>
-            <a:off x="4674240" y="1600200"/>
-            <a:ext cx="4015440" cy="4525200"/>
+            <a:off x="4673880" y="1600200"/>
+            <a:ext cx="4015080" cy="4524840"/>
           </a:xfrm>
           <a:prstGeom prst="rect">
             <a:avLst/>
@@ -4041,7 +4042,7 @@
         <p:spPr>
           <a:xfrm>
             <a:off x="3124080" y="6356520"/>
-            <a:ext cx="2894760" cy="364320"/>
+            <a:ext cx="2894400" cy="363960"/>
           </a:xfrm>
           <a:prstGeom prst="rect">
             <a:avLst/>
@@ -4113,7 +4114,7 @@
         <p:spPr>
           <a:xfrm>
             <a:off x="6553080" y="6356520"/>
-            <a:ext cx="2133000" cy="364320"/>
+            <a:ext cx="2132640" cy="363960"/>
           </a:xfrm>
           <a:prstGeom prst="rect">
             <a:avLst/>
@@ -4156,7 +4157,7 @@
                 <a:tab algn="l" pos="0"/>
               </a:tabLst>
             </a:pPr>
-            <a:fld id="{1E51ED0C-4097-4C88-9526-7432CAF55D8D}" type="slidenum">
+            <a:fld id="{038E1FEE-15AA-4192-B5A4-754CBE75F325}" type="slidenum">
               <a:rPr b="0" lang="en-US" sz="1200" spc="-1" strike="noStrike">
                 <a:solidFill>
                   <a:schemeClr val="dk1">
@@ -4189,7 +4190,7 @@
         <p:spPr>
           <a:xfrm>
             <a:off x="457200" y="6356520"/>
-            <a:ext cx="2133000" cy="364320"/>
+            <a:ext cx="2132640" cy="363960"/>
           </a:xfrm>
           <a:prstGeom prst="rect">
             <a:avLst/>
@@ -4282,7 +4283,7 @@
         <p:spPr>
           <a:xfrm>
             <a:off x="3124080" y="6356520"/>
-            <a:ext cx="2894760" cy="364320"/>
+            <a:ext cx="2894400" cy="363960"/>
           </a:xfrm>
           <a:prstGeom prst="rect">
             <a:avLst/>
@@ -4354,7 +4355,7 @@
         <p:spPr>
           <a:xfrm>
             <a:off x="6553080" y="6356520"/>
-            <a:ext cx="2133000" cy="364320"/>
+            <a:ext cx="2132640" cy="363960"/>
           </a:xfrm>
           <a:prstGeom prst="rect">
             <a:avLst/>
@@ -4397,7 +4398,7 @@
                 <a:tab algn="l" pos="0"/>
               </a:tabLst>
             </a:pPr>
-            <a:fld id="{68AC420D-045A-49B9-850F-6DFF724580B0}" type="slidenum">
+            <a:fld id="{088B751B-8DA7-4BB6-9D67-848BE812C789}" type="slidenum">
               <a:rPr b="0" lang="en-US" sz="1200" spc="-1" strike="noStrike">
                 <a:solidFill>
                   <a:schemeClr val="dk1">
@@ -4430,7 +4431,7 @@
         <p:spPr>
           <a:xfrm>
             <a:off x="457200" y="6356520"/>
-            <a:ext cx="2133000" cy="364320"/>
+            <a:ext cx="2132640" cy="363960"/>
           </a:xfrm>
           <a:prstGeom prst="rect">
             <a:avLst/>
@@ -4523,7 +4524,7 @@
         <p:spPr>
           <a:xfrm>
             <a:off x="457200" y="274680"/>
-            <a:ext cx="8228880" cy="1142280"/>
+            <a:ext cx="8228520" cy="1141920"/>
           </a:xfrm>
           <a:prstGeom prst="rect">
             <a:avLst/>
@@ -4572,7 +4573,7 @@
         <p:spPr>
           <a:xfrm>
             <a:off x="3124080" y="6356520"/>
-            <a:ext cx="2894760" cy="364320"/>
+            <a:ext cx="2894400" cy="363960"/>
           </a:xfrm>
           <a:prstGeom prst="rect">
             <a:avLst/>
@@ -4644,7 +4645,7 @@
         <p:spPr>
           <a:xfrm>
             <a:off x="6553080" y="6356520"/>
-            <a:ext cx="2133000" cy="364320"/>
+            <a:ext cx="2132640" cy="363960"/>
           </a:xfrm>
           <a:prstGeom prst="rect">
             <a:avLst/>
@@ -4687,7 +4688,7 @@
                 <a:tab algn="l" pos="0"/>
               </a:tabLst>
             </a:pPr>
-            <a:fld id="{5BD66468-72CF-4FEC-9384-884D7C9D3C54}" type="slidenum">
+            <a:fld id="{08EE2C96-00B2-4C66-AB2B-3D6227D168DD}" type="slidenum">
               <a:rPr b="0" lang="en-US" sz="1200" spc="-1" strike="noStrike">
                 <a:solidFill>
                   <a:schemeClr val="dk1">
@@ -4720,7 +4721,7 @@
         <p:spPr>
           <a:xfrm>
             <a:off x="457200" y="6356520"/>
-            <a:ext cx="2133000" cy="364320"/>
+            <a:ext cx="2132640" cy="363960"/>
           </a:xfrm>
           <a:prstGeom prst="rect">
             <a:avLst/>
@@ -4813,7 +4814,7 @@
         <p:spPr>
           <a:xfrm>
             <a:off x="3124080" y="6356520"/>
-            <a:ext cx="2894760" cy="364320"/>
+            <a:ext cx="2894400" cy="363960"/>
           </a:xfrm>
           <a:prstGeom prst="rect">
             <a:avLst/>
@@ -4885,7 +4886,7 @@
         <p:spPr>
           <a:xfrm>
             <a:off x="6553080" y="6356520"/>
-            <a:ext cx="2133000" cy="364320"/>
+            <a:ext cx="2132640" cy="363960"/>
           </a:xfrm>
           <a:prstGeom prst="rect">
             <a:avLst/>
@@ -4928,7 +4929,7 @@
                 <a:tab algn="l" pos="0"/>
               </a:tabLst>
             </a:pPr>
-            <a:fld id="{09E20F18-E7B2-4740-AB44-71A0A3A4AD0F}" type="slidenum">
+            <a:fld id="{8A359D2F-278B-4442-93E2-9A974F967C0E}" type="slidenum">
               <a:rPr b="0" lang="en-US" sz="1200" spc="-1" strike="noStrike">
                 <a:solidFill>
                   <a:schemeClr val="dk1">
@@ -4961,7 +4962,7 @@
         <p:spPr>
           <a:xfrm>
             <a:off x="457200" y="6356520"/>
-            <a:ext cx="2133000" cy="364320"/>
+            <a:ext cx="2132640" cy="363960"/>
           </a:xfrm>
           <a:prstGeom prst="rect">
             <a:avLst/>
@@ -5047,7 +5048,7 @@
         <p:spPr>
           <a:xfrm>
             <a:off x="685800" y="2130480"/>
-            <a:ext cx="7771680" cy="1469160"/>
+            <a:ext cx="7771320" cy="1468800"/>
           </a:xfrm>
           <a:prstGeom prst="rect">
             <a:avLst/>
@@ -5102,7 +5103,7 @@
         <p:spPr>
           <a:xfrm>
             <a:off x="1371600" y="3886200"/>
-            <a:ext cx="6400080" cy="1751760"/>
+            <a:ext cx="6399720" cy="1751400"/>
           </a:xfrm>
           <a:prstGeom prst="rect">
             <a:avLst/>
@@ -5243,7 +5244,7 @@
         <p:spPr>
           <a:xfrm>
             <a:off x="457200" y="274680"/>
-            <a:ext cx="8228880" cy="1142280"/>
+            <a:ext cx="8228520" cy="1141920"/>
           </a:xfrm>
           <a:prstGeom prst="rect">
             <a:avLst/>
@@ -5298,7 +5299,7 @@
         <p:spPr>
           <a:xfrm>
             <a:off x="457200" y="1600200"/>
-            <a:ext cx="8228880" cy="4525200"/>
+            <a:ext cx="8228520" cy="4524840"/>
           </a:xfrm>
           <a:prstGeom prst="rect">
             <a:avLst/>
@@ -5507,7 +5508,7 @@
         <p:spPr>
           <a:xfrm>
             <a:off x="457200" y="274680"/>
-            <a:ext cx="8228880" cy="1142280"/>
+            <a:ext cx="8228520" cy="1141920"/>
           </a:xfrm>
           <a:prstGeom prst="rect">
             <a:avLst/>
@@ -5562,7 +5563,7 @@
         <p:spPr>
           <a:xfrm>
             <a:off x="457200" y="1600200"/>
-            <a:ext cx="8228880" cy="4525200"/>
+            <a:ext cx="8228520" cy="4524840"/>
           </a:xfrm>
           <a:prstGeom prst="rect">
             <a:avLst/>
@@ -5902,7 +5903,7 @@
         <p:spPr>
           <a:xfrm>
             <a:off x="457200" y="274680"/>
-            <a:ext cx="8228880" cy="1142280"/>
+            <a:ext cx="8228520" cy="1141920"/>
           </a:xfrm>
           <a:prstGeom prst="rect">
             <a:avLst/>
@@ -5957,7 +5958,7 @@
         <p:spPr>
           <a:xfrm>
             <a:off x="457200" y="1600200"/>
-            <a:ext cx="8228880" cy="4525200"/>
+            <a:ext cx="8228520" cy="4524840"/>
           </a:xfrm>
           <a:prstGeom prst="rect">
             <a:avLst/>
@@ -6476,7 +6477,7 @@
         <p:spPr>
           <a:xfrm>
             <a:off x="457200" y="274680"/>
-            <a:ext cx="8228880" cy="1142280"/>
+            <a:ext cx="8228520" cy="1141920"/>
           </a:xfrm>
           <a:prstGeom prst="rect">
             <a:avLst/>
@@ -6531,7 +6532,7 @@
         <p:spPr>
           <a:xfrm>
             <a:off x="457200" y="1600200"/>
-            <a:ext cx="8228880" cy="4525200"/>
+            <a:ext cx="8228520" cy="4524840"/>
           </a:xfrm>
           <a:prstGeom prst="rect">
             <a:avLst/>
@@ -7343,7 +7344,7 @@
         <p:spPr>
           <a:xfrm>
             <a:off x="457200" y="274680"/>
-            <a:ext cx="8228880" cy="1142280"/>
+            <a:ext cx="8228520" cy="1141920"/>
           </a:xfrm>
           <a:prstGeom prst="rect">
             <a:avLst/>
@@ -7398,7 +7399,7 @@
         <p:spPr>
           <a:xfrm>
             <a:off x="457200" y="1600200"/>
-            <a:ext cx="8228880" cy="4525200"/>
+            <a:ext cx="8228520" cy="4524840"/>
           </a:xfrm>
           <a:prstGeom prst="rect">
             <a:avLst/>
@@ -7586,7 +7587,7 @@
         <p:spPr>
           <a:xfrm>
             <a:off x="457200" y="274680"/>
-            <a:ext cx="8228880" cy="1142280"/>
+            <a:ext cx="8228520" cy="1141920"/>
           </a:xfrm>
           <a:prstGeom prst="rect">
             <a:avLst/>
@@ -7641,7 +7642,7 @@
         <p:spPr>
           <a:xfrm>
             <a:off x="457200" y="2880000"/>
-            <a:ext cx="8246160" cy="1966320"/>
+            <a:ext cx="8245800" cy="1965960"/>
           </a:xfrm>
           <a:prstGeom prst="rect">
             <a:avLst/>
@@ -7664,7 +7665,115 @@
         <p:spPr>
           <a:xfrm>
             <a:off x="473040" y="1633680"/>
-            <a:ext cx="6186960" cy="944640"/>
+            <a:ext cx="6186600" cy="944280"/>
+          </a:xfrm>
+          <a:prstGeom prst="rect">
+            <a:avLst/>
+          </a:prstGeom>
+          <a:ln w="0">
+            <a:noFill/>
+          </a:ln>
+        </p:spPr>
+      </p:pic>
+    </p:spTree>
+  </p:cSld>
+  <mc:AlternateContent>
+    <mc:Choice Requires="p14">
+      <p:transition spd="slow" p14:dur="2000"/>
+    </mc:Choice>
+    <mc:Fallback>
+      <p:transition spd="slow"/>
+    </mc:Fallback>
+  </mc:AlternateContent>
+</p:sld>
+</file>
+
+<file path=ppt/slides/slide8.xml><?xml version="1.0" encoding="utf-8"?>
+<p:sld xmlns:a="http://schemas.openxmlformats.org/drawingml/2006/main" xmlns:p="http://schemas.openxmlformats.org/presentationml/2006/main" xmlns:r="http://schemas.openxmlformats.org/officeDocument/2006/relationships" xmlns:p14="http://schemas.microsoft.com/office/powerpoint/2010/main" xmlns:p15="http://schemas.microsoft.com/office/powerpoint/2012/main" xmlns:mc="http://schemas.openxmlformats.org/markup-compatibility/2006">
+  <p:cSld>
+    <p:spTree>
+      <p:nvGrpSpPr>
+        <p:cNvPr id="1" name=""/>
+        <p:cNvGrpSpPr/>
+        <p:nvPr/>
+      </p:nvGrpSpPr>
+      <p:grpSpPr>
+        <a:xfrm>
+          <a:off x="0" y="0"/>
+          <a:ext cx="0" cy="0"/>
+          <a:chOff x="0" y="0"/>
+          <a:chExt cx="0" cy="0"/>
+        </a:xfrm>
+      </p:grpSpPr>
+      <p:sp>
+        <p:nvSpPr>
+          <p:cNvPr id="64" name="PlaceHolder 1"/>
+          <p:cNvSpPr>
+            <a:spLocks noGrp="1"/>
+          </p:cNvSpPr>
+          <p:nvPr>
+            <p:ph type="title"/>
+          </p:nvPr>
+        </p:nvSpPr>
+        <p:spPr>
+          <a:xfrm>
+            <a:off x="457200" y="274680"/>
+            <a:ext cx="8228520" cy="1141920"/>
+          </a:xfrm>
+          <a:prstGeom prst="rect">
+            <a:avLst/>
+          </a:prstGeom>
+          <a:noFill/>
+          <a:ln w="0">
+            <a:noFill/>
+          </a:ln>
+        </p:spPr>
+        <p:txBody>
+          <a:bodyPr lIns="91440" rIns="91440" tIns="45720" bIns="45720" anchor="ctr">
+            <a:noAutofit/>
+          </a:bodyPr>
+          <a:p>
+            <a:pPr indent="0" algn="ctr" defTabSz="457200">
+              <a:lnSpc>
+                <a:spcPct val="100000"/>
+              </a:lnSpc>
+              <a:buNone/>
+              <a:tabLst>
+                <a:tab algn="l" pos="0"/>
+              </a:tabLst>
+            </a:pPr>
+            <a:r>
+              <a:rPr b="0" lang="en-US" sz="4400" spc="-1" strike="noStrike">
+                <a:solidFill>
+                  <a:schemeClr val="dk1"/>
+                </a:solidFill>
+                <a:latin typeface="Calibri"/>
+              </a:rPr>
+              <a:t>Evidência de Execução</a:t>
+            </a:r>
+            <a:endParaRPr b="0" lang="pt-BR" sz="4400" spc="-1" strike="noStrike">
+              <a:solidFill>
+                <a:srgbClr val="000000"/>
+              </a:solidFill>
+              <a:latin typeface="Arial"/>
+            </a:endParaRPr>
+          </a:p>
+        </p:txBody>
+      </p:sp>
+      <p:pic>
+        <p:nvPicPr>
+          <p:cNvPr id="65" name="" descr=""/>
+          <p:cNvPicPr/>
+          <p:nvPr/>
+        </p:nvPicPr>
+        <p:blipFill>
+          <a:blip r:embed="rId1"/>
+          <a:stretch/>
+        </p:blipFill>
+        <p:spPr>
+          <a:xfrm>
+            <a:off x="540000" y="1620000"/>
+            <a:ext cx="8280000" cy="4068000"/>
           </a:xfrm>
           <a:prstGeom prst="rect">
             <a:avLst/>

</xml_diff>

<commit_message>
feat: Adicionada referência para o Github na apresentação
</commit_message>
<xml_diff>
--- a/Documentacao_Testes.pptx
+++ b/Documentacao_Testes.pptx
@@ -23,6 +23,7 @@
     <p:sldId id="261" r:id="rId18"/>
     <p:sldId id="262" r:id="rId19"/>
     <p:sldId id="263" r:id="rId20"/>
+    <p:sldId id="264" r:id="rId21"/>
   </p:sldIdLst>
   <p:sldSz cx="9144000" cy="6858000"/>
   <p:notesSz cx="7559675" cy="10691813"/>
@@ -59,7 +60,7 @@
         <p:spPr>
           <a:xfrm>
             <a:off x="457200" y="274680"/>
-            <a:ext cx="8228520" cy="1141920"/>
+            <a:ext cx="8228160" cy="1141560"/>
           </a:xfrm>
           <a:prstGeom prst="rect">
             <a:avLst/>
@@ -99,7 +100,7 @@
         <p:spPr>
           <a:xfrm>
             <a:off x="457200" y="1600200"/>
-            <a:ext cx="8228520" cy="4524840"/>
+            <a:ext cx="8228160" cy="4524480"/>
           </a:xfrm>
           <a:prstGeom prst="rect">
             <a:avLst/>
@@ -160,7 +161,7 @@
         <p:txBody>
           <a:bodyPr/>
           <a:p>
-            <a:fld id="{C15AED0E-0EBF-4E4C-8A1F-2621B75AD107}" type="slidenum">
+            <a:fld id="{3F55531F-8353-4714-8220-6E5DC6DE4BD7}" type="slidenum">
               <a:t>&lt;#&gt;</a:t>
             </a:fld>
           </a:p>
@@ -243,7 +244,7 @@
         <p:txBody>
           <a:bodyPr/>
           <a:p>
-            <a:fld id="{97EFAFFB-B5DC-45AA-ABEF-CB9B2C1D7041}" type="slidenum">
+            <a:fld id="{ABC1559E-1CFC-4D9C-87E1-238DBCC71808}" type="slidenum">
               <a:t>&lt;#&gt;</a:t>
             </a:fld>
           </a:p>
@@ -326,7 +327,7 @@
         <p:txBody>
           <a:bodyPr/>
           <a:p>
-            <a:fld id="{8D041D09-46BC-4EE4-94A8-446E66F21529}" type="slidenum">
+            <a:fld id="{02EE7A32-CE79-4055-9650-555BE74AF253}" type="slidenum">
               <a:t>&lt;#&gt;</a:t>
             </a:fld>
           </a:p>
@@ -409,7 +410,7 @@
         <p:txBody>
           <a:bodyPr/>
           <a:p>
-            <a:fld id="{D6374F6E-1A33-40B5-810E-B13C2AF1EEE9}" type="slidenum">
+            <a:fld id="{F6B1E80B-01BE-4378-9403-B15A24D0CA91}" type="slidenum">
               <a:t>&lt;#&gt;</a:t>
             </a:fld>
           </a:p>
@@ -492,7 +493,7 @@
         <p:txBody>
           <a:bodyPr/>
           <a:p>
-            <a:fld id="{464D7247-A3ED-426B-8C88-7184719E5773}" type="slidenum">
+            <a:fld id="{86D50EA0-F159-4B48-B237-597B633E7C6D}" type="slidenum">
               <a:t>&lt;#&gt;</a:t>
             </a:fld>
           </a:p>
@@ -554,7 +555,7 @@
         <p:spPr>
           <a:xfrm>
             <a:off x="457200" y="274680"/>
-            <a:ext cx="8228520" cy="1141920"/>
+            <a:ext cx="8228160" cy="1141560"/>
           </a:xfrm>
           <a:prstGeom prst="rect">
             <a:avLst/>
@@ -594,7 +595,7 @@
         <p:spPr>
           <a:xfrm>
             <a:off x="457200" y="1600200"/>
-            <a:ext cx="8228520" cy="4524840"/>
+            <a:ext cx="8228160" cy="4524480"/>
           </a:xfrm>
           <a:prstGeom prst="rect">
             <a:avLst/>
@@ -658,7 +659,7 @@
         <p:txBody>
           <a:bodyPr/>
           <a:p>
-            <a:fld id="{3EE102DE-0660-415A-AB13-0880D996001C}" type="slidenum">
+            <a:fld id="{C2410089-96D4-4D68-AE3B-41DF5BF3B45B}" type="slidenum">
               <a:t>&lt;#&gt;</a:t>
             </a:fld>
           </a:p>
@@ -741,7 +742,7 @@
         <p:txBody>
           <a:bodyPr/>
           <a:p>
-            <a:fld id="{E7F456A7-CACC-4DD2-AE67-D179BED08112}" type="slidenum">
+            <a:fld id="{B787BC64-ACAD-4DFC-9388-A273CA09485B}" type="slidenum">
               <a:t>&lt;#&gt;</a:t>
             </a:fld>
           </a:p>
@@ -803,7 +804,7 @@
         <p:spPr>
           <a:xfrm>
             <a:off x="457200" y="274680"/>
-            <a:ext cx="8228520" cy="1141920"/>
+            <a:ext cx="8228160" cy="1141560"/>
           </a:xfrm>
           <a:prstGeom prst="rect">
             <a:avLst/>
@@ -843,7 +844,7 @@
         <p:spPr>
           <a:xfrm>
             <a:off x="457200" y="1600200"/>
-            <a:ext cx="4015440" cy="4524840"/>
+            <a:ext cx="4015080" cy="4524480"/>
           </a:xfrm>
           <a:prstGeom prst="rect">
             <a:avLst/>
@@ -885,8 +886,8 @@
         </p:nvSpPr>
         <p:spPr>
           <a:xfrm>
-            <a:off x="4673880" y="1600200"/>
-            <a:ext cx="4015440" cy="4524840"/>
+            <a:off x="4673520" y="1600200"/>
+            <a:ext cx="4015080" cy="4524480"/>
           </a:xfrm>
           <a:prstGeom prst="rect">
             <a:avLst/>
@@ -950,7 +951,7 @@
         <p:txBody>
           <a:bodyPr/>
           <a:p>
-            <a:fld id="{78528BB0-F3A9-4175-AC78-26EDEE78741F}" type="slidenum">
+            <a:fld id="{9B024118-7107-4BE7-B493-F40133041930}" type="slidenum">
               <a:t>&lt;#&gt;</a:t>
             </a:fld>
           </a:p>
@@ -1033,7 +1034,7 @@
         <p:txBody>
           <a:bodyPr/>
           <a:p>
-            <a:fld id="{13455B05-E579-408C-AEA4-665548778EC6}" type="slidenum">
+            <a:fld id="{F5064A2C-F6E3-4B19-AFCD-5C11ED1A7CAC}" type="slidenum">
               <a:t>&lt;#&gt;</a:t>
             </a:fld>
           </a:p>
@@ -1095,7 +1096,7 @@
         <p:spPr>
           <a:xfrm>
             <a:off x="457200" y="274680"/>
-            <a:ext cx="8228520" cy="1141920"/>
+            <a:ext cx="8228160" cy="1141560"/>
           </a:xfrm>
           <a:prstGeom prst="rect">
             <a:avLst/>
@@ -1156,7 +1157,7 @@
         <p:txBody>
           <a:bodyPr/>
           <a:p>
-            <a:fld id="{7FB2CBDC-AF33-4169-95C7-E465DB7B9523}" type="slidenum">
+            <a:fld id="{D080A2C8-E536-4B13-89F0-5915BA72CF24}" type="slidenum">
               <a:t>&lt;#&gt;</a:t>
             </a:fld>
           </a:p>
@@ -1239,7 +1240,7 @@
         <p:txBody>
           <a:bodyPr/>
           <a:p>
-            <a:fld id="{CBDB2EE0-3046-4280-9549-892B6529B444}" type="slidenum">
+            <a:fld id="{C7870CF0-27E5-4B46-A5E6-DD70DD95D222}" type="slidenum">
               <a:t>&lt;#&gt;</a:t>
             </a:fld>
           </a:p>
@@ -1308,7 +1309,7 @@
         <p:spPr>
           <a:xfrm>
             <a:off x="457200" y="274680"/>
-            <a:ext cx="8228520" cy="1141920"/>
+            <a:ext cx="8228160" cy="1141560"/>
           </a:xfrm>
           <a:prstGeom prst="rect">
             <a:avLst/>
@@ -1357,7 +1358,7 @@
         <p:spPr>
           <a:xfrm>
             <a:off x="3124080" y="6356520"/>
-            <a:ext cx="2894400" cy="363960"/>
+            <a:ext cx="2894040" cy="363600"/>
           </a:xfrm>
           <a:prstGeom prst="rect">
             <a:avLst/>
@@ -1405,7 +1406,7 @@
                 </a:solidFill>
                 <a:latin typeface="Times New Roman"/>
               </a:rPr>
-              <a:t>&lt;rodapé&gt;</a:t>
+              <a:t> </a:t>
             </a:r>
             <a:endParaRPr b="0" lang="pt-BR" sz="1400" spc="-1" strike="noStrike">
               <a:solidFill>
@@ -1429,7 +1430,7 @@
         <p:spPr>
           <a:xfrm>
             <a:off x="6553080" y="6356520"/>
-            <a:ext cx="2132640" cy="363960"/>
+            <a:ext cx="2132280" cy="363600"/>
           </a:xfrm>
           <a:prstGeom prst="rect">
             <a:avLst/>
@@ -1472,7 +1473,7 @@
                 <a:tab algn="l" pos="0"/>
               </a:tabLst>
             </a:pPr>
-            <a:fld id="{85AC1EF3-4678-4AEB-B7D6-DAE10C3457FC}" type="slidenum">
+            <a:fld id="{E589BFC9-CD78-41B4-B0F6-0C85C56435E7}" type="slidenum">
               <a:rPr b="0" lang="en-US" sz="1200" spc="-1" strike="noStrike">
                 <a:solidFill>
                   <a:schemeClr val="dk1">
@@ -1481,7 +1482,7 @@
                 </a:solidFill>
                 <a:latin typeface="Calibri"/>
               </a:rPr>
-              <a:t>&lt;número&gt;</a:t>
+              <a:t>9</a:t>
             </a:fld>
             <a:endParaRPr b="0" lang="pt-BR" sz="1200" spc="-1" strike="noStrike">
               <a:solidFill>
@@ -1505,7 +1506,7 @@
         <p:spPr>
           <a:xfrm>
             <a:off x="457200" y="6356520"/>
-            <a:ext cx="2132640" cy="363960"/>
+            <a:ext cx="2132280" cy="363600"/>
           </a:xfrm>
           <a:prstGeom prst="rect">
             <a:avLst/>
@@ -1541,7 +1542,7 @@
                 </a:solidFill>
                 <a:latin typeface="Times New Roman"/>
               </a:rPr>
-              <a:t>&lt;data/hora&gt;</a:t>
+              <a:t> </a:t>
             </a:r>
             <a:endParaRPr b="0" lang="pt-BR" sz="1400" spc="-1" strike="noStrike">
               <a:solidFill>
@@ -1823,7 +1824,7 @@
         <p:spPr>
           <a:xfrm>
             <a:off x="3124080" y="6356520"/>
-            <a:ext cx="2894400" cy="363960"/>
+            <a:ext cx="2894040" cy="363600"/>
           </a:xfrm>
           <a:prstGeom prst="rect">
             <a:avLst/>
@@ -1895,7 +1896,7 @@
         <p:spPr>
           <a:xfrm>
             <a:off x="6553080" y="6356520"/>
-            <a:ext cx="2132640" cy="363960"/>
+            <a:ext cx="2132280" cy="363600"/>
           </a:xfrm>
           <a:prstGeom prst="rect">
             <a:avLst/>
@@ -1938,7 +1939,7 @@
                 <a:tab algn="l" pos="0"/>
               </a:tabLst>
             </a:pPr>
-            <a:fld id="{393E4917-A43B-4E89-BDD7-3BDD2048BFCD}" type="slidenum">
+            <a:fld id="{7B4CB9E1-7E7E-4873-B108-C9A20B7EB10D}" type="slidenum">
               <a:rPr b="0" lang="en-US" sz="1200" spc="-1" strike="noStrike">
                 <a:solidFill>
                   <a:schemeClr val="dk1">
@@ -1971,7 +1972,7 @@
         <p:spPr>
           <a:xfrm>
             <a:off x="457200" y="6356520"/>
-            <a:ext cx="2132640" cy="363960"/>
+            <a:ext cx="2132280" cy="363600"/>
           </a:xfrm>
           <a:prstGeom prst="rect">
             <a:avLst/>
@@ -2064,7 +2065,7 @@
         <p:spPr>
           <a:xfrm>
             <a:off x="3124080" y="6356520"/>
-            <a:ext cx="2894400" cy="363960"/>
+            <a:ext cx="2894040" cy="363600"/>
           </a:xfrm>
           <a:prstGeom prst="rect">
             <a:avLst/>
@@ -2136,7 +2137,7 @@
         <p:spPr>
           <a:xfrm>
             <a:off x="6553080" y="6356520"/>
-            <a:ext cx="2132640" cy="363960"/>
+            <a:ext cx="2132280" cy="363600"/>
           </a:xfrm>
           <a:prstGeom prst="rect">
             <a:avLst/>
@@ -2179,7 +2180,7 @@
                 <a:tab algn="l" pos="0"/>
               </a:tabLst>
             </a:pPr>
-            <a:fld id="{E42D2E80-3DB4-4479-B18A-0F8E0DC28AE0}" type="slidenum">
+            <a:fld id="{2EEAE7D0-575B-4EB9-B110-90226F31D0E2}" type="slidenum">
               <a:rPr b="0" lang="en-US" sz="1200" spc="-1" strike="noStrike">
                 <a:solidFill>
                   <a:schemeClr val="dk1">
@@ -2212,7 +2213,7 @@
         <p:spPr>
           <a:xfrm>
             <a:off x="457200" y="6356520"/>
-            <a:ext cx="2132640" cy="363960"/>
+            <a:ext cx="2132280" cy="363600"/>
           </a:xfrm>
           <a:prstGeom prst="rect">
             <a:avLst/>
@@ -2305,7 +2306,7 @@
         <p:spPr>
           <a:xfrm>
             <a:off x="3124080" y="6356520"/>
-            <a:ext cx="2894400" cy="363960"/>
+            <a:ext cx="2894040" cy="363600"/>
           </a:xfrm>
           <a:prstGeom prst="rect">
             <a:avLst/>
@@ -2377,7 +2378,7 @@
         <p:spPr>
           <a:xfrm>
             <a:off x="6553080" y="6356520"/>
-            <a:ext cx="2132640" cy="363960"/>
+            <a:ext cx="2132280" cy="363600"/>
           </a:xfrm>
           <a:prstGeom prst="rect">
             <a:avLst/>
@@ -2420,7 +2421,7 @@
                 <a:tab algn="l" pos="0"/>
               </a:tabLst>
             </a:pPr>
-            <a:fld id="{70AC6F16-E445-49D9-A6F1-CC9EDCD04F10}" type="slidenum">
+            <a:fld id="{2EE399A5-E5E6-4440-95EC-496B7E7C86F7}" type="slidenum">
               <a:rPr b="0" lang="en-US" sz="1200" spc="-1" strike="noStrike">
                 <a:solidFill>
                   <a:schemeClr val="dk1">
@@ -2453,7 +2454,7 @@
         <p:spPr>
           <a:xfrm>
             <a:off x="457200" y="6356520"/>
-            <a:ext cx="2132640" cy="363960"/>
+            <a:ext cx="2132280" cy="363600"/>
           </a:xfrm>
           <a:prstGeom prst="rect">
             <a:avLst/>
@@ -2546,7 +2547,7 @@
         <p:spPr>
           <a:xfrm>
             <a:off x="3124080" y="6356520"/>
-            <a:ext cx="2894400" cy="363960"/>
+            <a:ext cx="2894040" cy="363600"/>
           </a:xfrm>
           <a:prstGeom prst="rect">
             <a:avLst/>
@@ -2618,7 +2619,7 @@
         <p:spPr>
           <a:xfrm>
             <a:off x="6553080" y="6356520"/>
-            <a:ext cx="2132640" cy="363960"/>
+            <a:ext cx="2132280" cy="363600"/>
           </a:xfrm>
           <a:prstGeom prst="rect">
             <a:avLst/>
@@ -2661,7 +2662,7 @@
                 <a:tab algn="l" pos="0"/>
               </a:tabLst>
             </a:pPr>
-            <a:fld id="{4ADCE783-A40B-4738-9F7C-22E27BEA5D96}" type="slidenum">
+            <a:fld id="{637935D0-5A68-466C-8527-0F9BF003B6D8}" type="slidenum">
               <a:rPr b="0" lang="en-US" sz="1200" spc="-1" strike="noStrike">
                 <a:solidFill>
                   <a:schemeClr val="dk1">
@@ -2694,7 +2695,7 @@
         <p:spPr>
           <a:xfrm>
             <a:off x="457200" y="6356520"/>
-            <a:ext cx="2132640" cy="363960"/>
+            <a:ext cx="2132280" cy="363600"/>
           </a:xfrm>
           <a:prstGeom prst="rect">
             <a:avLst/>
@@ -2787,7 +2788,7 @@
         <p:spPr>
           <a:xfrm>
             <a:off x="457200" y="274680"/>
-            <a:ext cx="8228520" cy="1141920"/>
+            <a:ext cx="8228160" cy="1141560"/>
           </a:xfrm>
           <a:prstGeom prst="rect">
             <a:avLst/>
@@ -2836,7 +2837,7 @@
         <p:spPr>
           <a:xfrm>
             <a:off x="457200" y="1600200"/>
-            <a:ext cx="8228520" cy="4524840"/>
+            <a:ext cx="8228160" cy="4524480"/>
           </a:xfrm>
           <a:prstGeom prst="rect">
             <a:avLst/>
@@ -3061,7 +3062,7 @@
         <p:spPr>
           <a:xfrm>
             <a:off x="3124080" y="6356520"/>
-            <a:ext cx="2894400" cy="363960"/>
+            <a:ext cx="2894040" cy="363600"/>
           </a:xfrm>
           <a:prstGeom prst="rect">
             <a:avLst/>
@@ -3133,7 +3134,7 @@
         <p:spPr>
           <a:xfrm>
             <a:off x="6553080" y="6356520"/>
-            <a:ext cx="2132640" cy="363960"/>
+            <a:ext cx="2132280" cy="363600"/>
           </a:xfrm>
           <a:prstGeom prst="rect">
             <a:avLst/>
@@ -3176,7 +3177,7 @@
                 <a:tab algn="l" pos="0"/>
               </a:tabLst>
             </a:pPr>
-            <a:fld id="{CF136039-2CAC-4155-90D9-A5524AAE8974}" type="slidenum">
+            <a:fld id="{302DA6F5-4393-4624-A317-73C786347660}" type="slidenum">
               <a:rPr b="0" lang="en-US" sz="1200" spc="-1" strike="noStrike">
                 <a:solidFill>
                   <a:schemeClr val="dk1">
@@ -3209,7 +3210,7 @@
         <p:spPr>
           <a:xfrm>
             <a:off x="457200" y="6356520"/>
-            <a:ext cx="2132640" cy="363960"/>
+            <a:ext cx="2132280" cy="363600"/>
           </a:xfrm>
           <a:prstGeom prst="rect">
             <a:avLst/>
@@ -3302,7 +3303,7 @@
         <p:spPr>
           <a:xfrm>
             <a:off x="3124080" y="6356520"/>
-            <a:ext cx="2894400" cy="363960"/>
+            <a:ext cx="2894040" cy="363600"/>
           </a:xfrm>
           <a:prstGeom prst="rect">
             <a:avLst/>
@@ -3374,7 +3375,7 @@
         <p:spPr>
           <a:xfrm>
             <a:off x="6553080" y="6356520"/>
-            <a:ext cx="2132640" cy="363960"/>
+            <a:ext cx="2132280" cy="363600"/>
           </a:xfrm>
           <a:prstGeom prst="rect">
             <a:avLst/>
@@ -3417,7 +3418,7 @@
                 <a:tab algn="l" pos="0"/>
               </a:tabLst>
             </a:pPr>
-            <a:fld id="{B50EFA96-26CB-4052-B3E9-11A91026A7AE}" type="slidenum">
+            <a:fld id="{5F4ECFA1-7905-49AD-AE1E-4A66013E28FD}" type="slidenum">
               <a:rPr b="0" lang="en-US" sz="1200" spc="-1" strike="noStrike">
                 <a:solidFill>
                   <a:schemeClr val="dk1">
@@ -3450,7 +3451,7 @@
         <p:spPr>
           <a:xfrm>
             <a:off x="457200" y="6356520"/>
-            <a:ext cx="2132640" cy="363960"/>
+            <a:ext cx="2132280" cy="363600"/>
           </a:xfrm>
           <a:prstGeom prst="rect">
             <a:avLst/>
@@ -3543,7 +3544,7 @@
         <p:spPr>
           <a:xfrm>
             <a:off x="457200" y="274680"/>
-            <a:ext cx="8228520" cy="1141920"/>
+            <a:ext cx="8228160" cy="1141560"/>
           </a:xfrm>
           <a:prstGeom prst="rect">
             <a:avLst/>
@@ -3592,7 +3593,7 @@
         <p:spPr>
           <a:xfrm>
             <a:off x="457200" y="1600200"/>
-            <a:ext cx="4015080" cy="4524840"/>
+            <a:ext cx="4015080" cy="4524480"/>
           </a:xfrm>
           <a:prstGeom prst="rect">
             <a:avLst/>
@@ -3817,7 +3818,7 @@
         <p:spPr>
           <a:xfrm>
             <a:off x="4673880" y="1600200"/>
-            <a:ext cx="4015080" cy="4524840"/>
+            <a:ext cx="4015080" cy="4524480"/>
           </a:xfrm>
           <a:prstGeom prst="rect">
             <a:avLst/>
@@ -4042,7 +4043,7 @@
         <p:spPr>
           <a:xfrm>
             <a:off x="3124080" y="6356520"/>
-            <a:ext cx="2894400" cy="363960"/>
+            <a:ext cx="2894040" cy="363600"/>
           </a:xfrm>
           <a:prstGeom prst="rect">
             <a:avLst/>
@@ -4114,7 +4115,7 @@
         <p:spPr>
           <a:xfrm>
             <a:off x="6553080" y="6356520"/>
-            <a:ext cx="2132640" cy="363960"/>
+            <a:ext cx="2132280" cy="363600"/>
           </a:xfrm>
           <a:prstGeom prst="rect">
             <a:avLst/>
@@ -4157,7 +4158,7 @@
                 <a:tab algn="l" pos="0"/>
               </a:tabLst>
             </a:pPr>
-            <a:fld id="{038E1FEE-15AA-4192-B5A4-754CBE75F325}" type="slidenum">
+            <a:fld id="{20ADE017-E35F-4C13-8D44-A62397A3F66B}" type="slidenum">
               <a:rPr b="0" lang="en-US" sz="1200" spc="-1" strike="noStrike">
                 <a:solidFill>
                   <a:schemeClr val="dk1">
@@ -4190,7 +4191,7 @@
         <p:spPr>
           <a:xfrm>
             <a:off x="457200" y="6356520"/>
-            <a:ext cx="2132640" cy="363960"/>
+            <a:ext cx="2132280" cy="363600"/>
           </a:xfrm>
           <a:prstGeom prst="rect">
             <a:avLst/>
@@ -4283,7 +4284,7 @@
         <p:spPr>
           <a:xfrm>
             <a:off x="3124080" y="6356520"/>
-            <a:ext cx="2894400" cy="363960"/>
+            <a:ext cx="2894040" cy="363600"/>
           </a:xfrm>
           <a:prstGeom prst="rect">
             <a:avLst/>
@@ -4355,7 +4356,7 @@
         <p:spPr>
           <a:xfrm>
             <a:off x="6553080" y="6356520"/>
-            <a:ext cx="2132640" cy="363960"/>
+            <a:ext cx="2132280" cy="363600"/>
           </a:xfrm>
           <a:prstGeom prst="rect">
             <a:avLst/>
@@ -4398,7 +4399,7 @@
                 <a:tab algn="l" pos="0"/>
               </a:tabLst>
             </a:pPr>
-            <a:fld id="{088B751B-8DA7-4BB6-9D67-848BE812C789}" type="slidenum">
+            <a:fld id="{0EF1C093-98FC-4DC2-993F-13DCFDC8E8FE}" type="slidenum">
               <a:rPr b="0" lang="en-US" sz="1200" spc="-1" strike="noStrike">
                 <a:solidFill>
                   <a:schemeClr val="dk1">
@@ -4431,7 +4432,7 @@
         <p:spPr>
           <a:xfrm>
             <a:off x="457200" y="6356520"/>
-            <a:ext cx="2132640" cy="363960"/>
+            <a:ext cx="2132280" cy="363600"/>
           </a:xfrm>
           <a:prstGeom prst="rect">
             <a:avLst/>
@@ -4524,7 +4525,7 @@
         <p:spPr>
           <a:xfrm>
             <a:off x="457200" y="274680"/>
-            <a:ext cx="8228520" cy="1141920"/>
+            <a:ext cx="8228160" cy="1141560"/>
           </a:xfrm>
           <a:prstGeom prst="rect">
             <a:avLst/>
@@ -4573,7 +4574,7 @@
         <p:spPr>
           <a:xfrm>
             <a:off x="3124080" y="6356520"/>
-            <a:ext cx="2894400" cy="363960"/>
+            <a:ext cx="2894040" cy="363600"/>
           </a:xfrm>
           <a:prstGeom prst="rect">
             <a:avLst/>
@@ -4645,7 +4646,7 @@
         <p:spPr>
           <a:xfrm>
             <a:off x="6553080" y="6356520"/>
-            <a:ext cx="2132640" cy="363960"/>
+            <a:ext cx="2132280" cy="363600"/>
           </a:xfrm>
           <a:prstGeom prst="rect">
             <a:avLst/>
@@ -4688,7 +4689,7 @@
                 <a:tab algn="l" pos="0"/>
               </a:tabLst>
             </a:pPr>
-            <a:fld id="{08EE2C96-00B2-4C66-AB2B-3D6227D168DD}" type="slidenum">
+            <a:fld id="{2CF13BE7-566D-491C-A9CD-6836F96856C9}" type="slidenum">
               <a:rPr b="0" lang="en-US" sz="1200" spc="-1" strike="noStrike">
                 <a:solidFill>
                   <a:schemeClr val="dk1">
@@ -4721,7 +4722,7 @@
         <p:spPr>
           <a:xfrm>
             <a:off x="457200" y="6356520"/>
-            <a:ext cx="2132640" cy="363960"/>
+            <a:ext cx="2132280" cy="363600"/>
           </a:xfrm>
           <a:prstGeom prst="rect">
             <a:avLst/>
@@ -4814,7 +4815,7 @@
         <p:spPr>
           <a:xfrm>
             <a:off x="3124080" y="6356520"/>
-            <a:ext cx="2894400" cy="363960"/>
+            <a:ext cx="2894040" cy="363600"/>
           </a:xfrm>
           <a:prstGeom prst="rect">
             <a:avLst/>
@@ -4886,7 +4887,7 @@
         <p:spPr>
           <a:xfrm>
             <a:off x="6553080" y="6356520"/>
-            <a:ext cx="2132640" cy="363960"/>
+            <a:ext cx="2132280" cy="363600"/>
           </a:xfrm>
           <a:prstGeom prst="rect">
             <a:avLst/>
@@ -4929,7 +4930,7 @@
                 <a:tab algn="l" pos="0"/>
               </a:tabLst>
             </a:pPr>
-            <a:fld id="{8A359D2F-278B-4442-93E2-9A974F967C0E}" type="slidenum">
+            <a:fld id="{5AD266DA-34BD-45B0-988E-F2B605C35269}" type="slidenum">
               <a:rPr b="0" lang="en-US" sz="1200" spc="-1" strike="noStrike">
                 <a:solidFill>
                   <a:schemeClr val="dk1">
@@ -4962,7 +4963,7 @@
         <p:spPr>
           <a:xfrm>
             <a:off x="457200" y="6356520"/>
-            <a:ext cx="2132640" cy="363960"/>
+            <a:ext cx="2132280" cy="363600"/>
           </a:xfrm>
           <a:prstGeom prst="rect">
             <a:avLst/>
@@ -5048,7 +5049,7 @@
         <p:spPr>
           <a:xfrm>
             <a:off x="685800" y="2130480"/>
-            <a:ext cx="7771320" cy="1468800"/>
+            <a:ext cx="7770960" cy="1468440"/>
           </a:xfrm>
           <a:prstGeom prst="rect">
             <a:avLst/>
@@ -5103,7 +5104,7 @@
         <p:spPr>
           <a:xfrm>
             <a:off x="1371600" y="3886200"/>
-            <a:ext cx="6399720" cy="1751400"/>
+            <a:ext cx="6399360" cy="1751040"/>
           </a:xfrm>
           <a:prstGeom prst="rect">
             <a:avLst/>
@@ -5244,7 +5245,7 @@
         <p:spPr>
           <a:xfrm>
             <a:off x="457200" y="274680"/>
-            <a:ext cx="8228520" cy="1141920"/>
+            <a:ext cx="8228160" cy="1141560"/>
           </a:xfrm>
           <a:prstGeom prst="rect">
             <a:avLst/>
@@ -5299,7 +5300,7 @@
         <p:spPr>
           <a:xfrm>
             <a:off x="457200" y="1600200"/>
-            <a:ext cx="8228520" cy="4524840"/>
+            <a:ext cx="8228160" cy="4524480"/>
           </a:xfrm>
           <a:prstGeom prst="rect">
             <a:avLst/>
@@ -5508,7 +5509,7 @@
         <p:spPr>
           <a:xfrm>
             <a:off x="457200" y="274680"/>
-            <a:ext cx="8228520" cy="1141920"/>
+            <a:ext cx="8228160" cy="1141560"/>
           </a:xfrm>
           <a:prstGeom prst="rect">
             <a:avLst/>
@@ -5563,7 +5564,7 @@
         <p:spPr>
           <a:xfrm>
             <a:off x="457200" y="1600200"/>
-            <a:ext cx="8228520" cy="4524840"/>
+            <a:ext cx="8228160" cy="4524480"/>
           </a:xfrm>
           <a:prstGeom prst="rect">
             <a:avLst/>
@@ -5903,7 +5904,7 @@
         <p:spPr>
           <a:xfrm>
             <a:off x="457200" y="274680"/>
-            <a:ext cx="8228520" cy="1141920"/>
+            <a:ext cx="8228160" cy="1141560"/>
           </a:xfrm>
           <a:prstGeom prst="rect">
             <a:avLst/>
@@ -5958,7 +5959,7 @@
         <p:spPr>
           <a:xfrm>
             <a:off x="457200" y="1600200"/>
-            <a:ext cx="8228520" cy="4524840"/>
+            <a:ext cx="8228160" cy="4524480"/>
           </a:xfrm>
           <a:prstGeom prst="rect">
             <a:avLst/>
@@ -6477,7 +6478,7 @@
         <p:spPr>
           <a:xfrm>
             <a:off x="457200" y="274680"/>
-            <a:ext cx="8228520" cy="1141920"/>
+            <a:ext cx="8228160" cy="1141560"/>
           </a:xfrm>
           <a:prstGeom prst="rect">
             <a:avLst/>
@@ -6532,7 +6533,7 @@
         <p:spPr>
           <a:xfrm>
             <a:off x="457200" y="1600200"/>
-            <a:ext cx="8228520" cy="4524840"/>
+            <a:ext cx="8228160" cy="4524480"/>
           </a:xfrm>
           <a:prstGeom prst="rect">
             <a:avLst/>
@@ -7344,7 +7345,7 @@
         <p:spPr>
           <a:xfrm>
             <a:off x="457200" y="274680"/>
-            <a:ext cx="8228520" cy="1141920"/>
+            <a:ext cx="8228160" cy="1141560"/>
           </a:xfrm>
           <a:prstGeom prst="rect">
             <a:avLst/>
@@ -7399,7 +7400,7 @@
         <p:spPr>
           <a:xfrm>
             <a:off x="457200" y="1600200"/>
-            <a:ext cx="8228520" cy="4524840"/>
+            <a:ext cx="8228160" cy="4524480"/>
           </a:xfrm>
           <a:prstGeom prst="rect">
             <a:avLst/>
@@ -7587,7 +7588,7 @@
         <p:spPr>
           <a:xfrm>
             <a:off x="457200" y="274680"/>
-            <a:ext cx="8228520" cy="1141920"/>
+            <a:ext cx="8228160" cy="1141560"/>
           </a:xfrm>
           <a:prstGeom prst="rect">
             <a:avLst/>
@@ -7642,7 +7643,7 @@
         <p:spPr>
           <a:xfrm>
             <a:off x="457200" y="2880000"/>
-            <a:ext cx="8245800" cy="1965960"/>
+            <a:ext cx="8245440" cy="1965600"/>
           </a:xfrm>
           <a:prstGeom prst="rect">
             <a:avLst/>
@@ -7665,7 +7666,7 @@
         <p:spPr>
           <a:xfrm>
             <a:off x="473040" y="1633680"/>
-            <a:ext cx="6186600" cy="944280"/>
+            <a:ext cx="6186240" cy="943920"/>
           </a:xfrm>
           <a:prstGeom prst="rect">
             <a:avLst/>
@@ -7718,7 +7719,7 @@
         <p:spPr>
           <a:xfrm>
             <a:off x="457200" y="274680"/>
-            <a:ext cx="8228520" cy="1141920"/>
+            <a:ext cx="8228160" cy="1141560"/>
           </a:xfrm>
           <a:prstGeom prst="rect">
             <a:avLst/>
@@ -7773,7 +7774,7 @@
         <p:spPr>
           <a:xfrm>
             <a:off x="540000" y="1620000"/>
-            <a:ext cx="8280000" cy="4068000"/>
+            <a:ext cx="8279640" cy="4067640"/>
           </a:xfrm>
           <a:prstGeom prst="rect">
             <a:avLst/>
@@ -7783,6 +7784,144 @@
           </a:ln>
         </p:spPr>
       </p:pic>
+    </p:spTree>
+  </p:cSld>
+  <mc:AlternateContent>
+    <mc:Choice Requires="p14">
+      <p:transition spd="slow" p14:dur="2000"/>
+    </mc:Choice>
+    <mc:Fallback>
+      <p:transition spd="slow"/>
+    </mc:Fallback>
+  </mc:AlternateContent>
+</p:sld>
+</file>
+
+<file path=ppt/slides/slide9.xml><?xml version="1.0" encoding="utf-8"?>
+<p:sld xmlns:a="http://schemas.openxmlformats.org/drawingml/2006/main" xmlns:p="http://schemas.openxmlformats.org/presentationml/2006/main" xmlns:r="http://schemas.openxmlformats.org/officeDocument/2006/relationships" xmlns:p14="http://schemas.microsoft.com/office/powerpoint/2010/main" xmlns:p15="http://schemas.microsoft.com/office/powerpoint/2012/main" xmlns:mc="http://schemas.openxmlformats.org/markup-compatibility/2006">
+  <p:cSld>
+    <p:spTree>
+      <p:nvGrpSpPr>
+        <p:cNvPr id="1" name=""/>
+        <p:cNvGrpSpPr/>
+        <p:nvPr/>
+      </p:nvGrpSpPr>
+      <p:grpSpPr>
+        <a:xfrm>
+          <a:off x="0" y="0"/>
+          <a:ext cx="0" cy="0"/>
+          <a:chOff x="0" y="0"/>
+          <a:chExt cx="0" cy="0"/>
+        </a:xfrm>
+      </p:grpSpPr>
+      <p:sp>
+        <p:nvSpPr>
+          <p:cNvPr id="66" name="PlaceHolder 1"/>
+          <p:cNvSpPr>
+            <a:spLocks noGrp="1"/>
+          </p:cNvSpPr>
+          <p:nvPr>
+            <p:ph type="title"/>
+          </p:nvPr>
+        </p:nvSpPr>
+        <p:spPr>
+          <a:xfrm>
+            <a:off x="457200" y="274680"/>
+            <a:ext cx="8228160" cy="1141560"/>
+          </a:xfrm>
+          <a:prstGeom prst="rect">
+            <a:avLst/>
+          </a:prstGeom>
+          <a:noFill/>
+          <a:ln w="0">
+            <a:noFill/>
+          </a:ln>
+        </p:spPr>
+        <p:txBody>
+          <a:bodyPr lIns="91440" rIns="91440" tIns="45720" bIns="45720" anchor="ctr">
+            <a:noAutofit/>
+          </a:bodyPr>
+          <a:p>
+            <a:pPr indent="0" algn="ctr" defTabSz="457200">
+              <a:lnSpc>
+                <a:spcPct val="100000"/>
+              </a:lnSpc>
+              <a:buNone/>
+              <a:tabLst>
+                <a:tab algn="l" pos="0"/>
+              </a:tabLst>
+            </a:pPr>
+            <a:r>
+              <a:rPr b="0" lang="en-US" sz="4400" spc="-1" strike="noStrike">
+                <a:solidFill>
+                  <a:schemeClr val="dk1"/>
+                </a:solidFill>
+                <a:latin typeface="Calibri"/>
+              </a:rPr>
+              <a:t>Repositório no Github</a:t>
+            </a:r>
+            <a:endParaRPr b="0" lang="pt-BR" sz="4400" spc="-1" strike="noStrike">
+              <a:solidFill>
+                <a:srgbClr val="000000"/>
+              </a:solidFill>
+              <a:latin typeface="Arial"/>
+            </a:endParaRPr>
+          </a:p>
+        </p:txBody>
+      </p:sp>
+      <p:sp>
+        <p:nvSpPr>
+          <p:cNvPr id="67" name="PlaceHolder 2"/>
+          <p:cNvSpPr>
+            <a:spLocks noGrp="1"/>
+          </p:cNvSpPr>
+          <p:nvPr>
+            <p:ph/>
+          </p:nvPr>
+        </p:nvSpPr>
+        <p:spPr>
+          <a:xfrm>
+            <a:off x="457200" y="1600200"/>
+            <a:ext cx="8228160" cy="4524480"/>
+          </a:xfrm>
+          <a:prstGeom prst="rect">
+            <a:avLst/>
+          </a:prstGeom>
+          <a:noFill/>
+          <a:ln w="0">
+            <a:noFill/>
+          </a:ln>
+        </p:spPr>
+        <p:txBody>
+          <a:bodyPr lIns="91440" rIns="91440" tIns="45720" bIns="45720" anchor="t">
+            <a:noAutofit/>
+          </a:bodyPr>
+          <a:p>
+            <a:pPr marL="432000" indent="0">
+              <a:spcBef>
+                <a:spcPts val="1417"/>
+              </a:spcBef>
+              <a:buNone/>
+            </a:pPr>
+            <a:r>
+              <a:rPr b="0" lang="pt-BR" sz="3200" spc="-1" strike="noStrike">
+                <a:solidFill>
+                  <a:srgbClr val="000000"/>
+                </a:solidFill>
+                <a:latin typeface="Arial"/>
+                <a:hlinkClick r:id="rId1"/>
+              </a:rPr>
+              <a:t>https://github.com/paulokrg/Fase7-Cap2-TestesAutomatizados</a:t>
+            </a:r>
+            <a:endParaRPr b="0" lang="pt-BR" sz="3200" spc="-1" strike="noStrike">
+              <a:solidFill>
+                <a:srgbClr val="000000"/>
+              </a:solidFill>
+              <a:latin typeface="Arial"/>
+            </a:endParaRPr>
+          </a:p>
+        </p:txBody>
+      </p:sp>
     </p:spTree>
   </p:cSld>
   <mc:AlternateContent>

</xml_diff>